<commit_message>
added utils required to run the code standalone
</commit_message>
<xml_diff>
--- a/BANG_Optimization_Presentation.pptx
+++ b/BANG_Optimization_Presentation.pptx
@@ -5,14 +5,15 @@
     <p:sldMasterId id="2147483672" r:id="rId1"/>
   </p:sldMasterIdLst>
   <p:notesMasterIdLst>
-    <p:notesMasterId r:id="rId7"/>
+    <p:notesMasterId r:id="rId8"/>
   </p:notesMasterIdLst>
   <p:sldIdLst>
     <p:sldId id="396" r:id="rId2"/>
     <p:sldId id="408" r:id="rId3"/>
-    <p:sldId id="412" r:id="rId4"/>
-    <p:sldId id="407" r:id="rId5"/>
-    <p:sldId id="411" r:id="rId6"/>
+    <p:sldId id="413" r:id="rId4"/>
+    <p:sldId id="412" r:id="rId5"/>
+    <p:sldId id="407" r:id="rId6"/>
+    <p:sldId id="411" r:id="rId7"/>
   </p:sldIdLst>
   <p:sldSz cx="12192000" cy="6858000"/>
   <p:notesSz cx="6858000" cy="9144000"/>
@@ -617,6 +618,85 @@
         <p:cNvPr id="1" name="">
           <a:extLst>
             <a:ext uri="{FF2B5EF4-FFF2-40B4-BE49-F238E27FC236}">
+              <a16:creationId xmlns:a16="http://schemas.microsoft.com/office/drawing/2014/main" id="{31B11A0F-AFB5-4F0C-357C-C8BA88B86F51}"/>
+            </a:ext>
+          </a:extLst>
+        </p:cNvPr>
+        <p:cNvGrpSpPr/>
+        <p:nvPr/>
+      </p:nvGrpSpPr>
+      <p:grpSpPr>
+        <a:xfrm>
+          <a:off x="0" y="0"/>
+          <a:ext cx="0" cy="0"/>
+          <a:chOff x="0" y="0"/>
+          <a:chExt cx="0" cy="0"/>
+        </a:xfrm>
+      </p:grpSpPr>
+      <p:sp>
+        <p:nvSpPr>
+          <p:cNvPr id="2" name="Slide Image Placeholder 1">
+            <a:extLst>
+              <a:ext uri="{FF2B5EF4-FFF2-40B4-BE49-F238E27FC236}">
+                <a16:creationId xmlns:a16="http://schemas.microsoft.com/office/drawing/2014/main" id="{0130BDBE-0BDE-E7B4-EB8B-D3E5E231F367}"/>
+              </a:ext>
+            </a:extLst>
+          </p:cNvPr>
+          <p:cNvSpPr>
+            <a:spLocks noGrp="1" noRot="1" noChangeAspect="1"/>
+          </p:cNvSpPr>
+          <p:nvPr>
+            <p:ph type="sldImg"/>
+          </p:nvPr>
+        </p:nvSpPr>
+        <p:spPr/>
+      </p:sp>
+      <p:sp>
+        <p:nvSpPr>
+          <p:cNvPr id="3" name="Notes Placeholder 2">
+            <a:extLst>
+              <a:ext uri="{FF2B5EF4-FFF2-40B4-BE49-F238E27FC236}">
+                <a16:creationId xmlns:a16="http://schemas.microsoft.com/office/drawing/2014/main" id="{8256286D-480D-A98B-7D82-F790AC740483}"/>
+              </a:ext>
+            </a:extLst>
+          </p:cNvPr>
+          <p:cNvSpPr>
+            <a:spLocks noGrp="1"/>
+          </p:cNvSpPr>
+          <p:nvPr>
+            <p:ph type="body" idx="1"/>
+          </p:nvPr>
+        </p:nvSpPr>
+        <p:spPr/>
+        <p:txBody>
+          <a:bodyPr/>
+          <a:lstStyle/>
+          <a:p>
+            <a:endParaRPr lang="en-IN" dirty="0"/>
+          </a:p>
+        </p:txBody>
+      </p:sp>
+    </p:spTree>
+    <p:extLst>
+      <p:ext uri="{BB962C8B-B14F-4D97-AF65-F5344CB8AC3E}">
+        <p14:creationId xmlns:p14="http://schemas.microsoft.com/office/powerpoint/2010/main" val="2412642506"/>
+      </p:ext>
+    </p:extLst>
+  </p:cSld>
+  <p:clrMapOvr>
+    <a:masterClrMapping/>
+  </p:clrMapOvr>
+</p:notes>
+</file>
+
+<file path=ppt/notesSlides/notesSlide4.xml><?xml version="1.0" encoding="utf-8"?>
+<p:notes xmlns:a="http://schemas.openxmlformats.org/drawingml/2006/main" xmlns:r="http://schemas.openxmlformats.org/officeDocument/2006/relationships" xmlns:p="http://schemas.openxmlformats.org/presentationml/2006/main">
+  <p:cSld>
+    <p:spTree>
+      <p:nvGrpSpPr>
+        <p:cNvPr id="1" name="">
+          <a:extLst>
+            <a:ext uri="{FF2B5EF4-FFF2-40B4-BE49-F238E27FC236}">
               <a16:creationId xmlns:a16="http://schemas.microsoft.com/office/drawing/2014/main" id="{4D5A0BCC-4061-9721-34BB-ED0321501A6D}"/>
             </a:ext>
           </a:extLst>
@@ -688,7 +768,7 @@
 </p:notes>
 </file>
 
-<file path=ppt/notesSlides/notesSlide4.xml><?xml version="1.0" encoding="utf-8"?>
+<file path=ppt/notesSlides/notesSlide5.xml><?xml version="1.0" encoding="utf-8"?>
 <p:notes xmlns:a="http://schemas.openxmlformats.org/drawingml/2006/main" xmlns:r="http://schemas.openxmlformats.org/officeDocument/2006/relationships" xmlns:p="http://schemas.openxmlformats.org/presentationml/2006/main">
   <p:cSld>
     <p:spTree>
@@ -7899,7 +7979,13 @@
   <p:cSld>
     <p:spTree>
       <p:nvGrpSpPr>
-        <p:cNvPr id="1" name=""/>
+        <p:cNvPr id="1" name="">
+          <a:extLst>
+            <a:ext uri="{FF2B5EF4-FFF2-40B4-BE49-F238E27FC236}">
+              <a16:creationId xmlns:a16="http://schemas.microsoft.com/office/drawing/2014/main" id="{A9586171-97C8-A149-80D4-F0DB33601F77}"/>
+            </a:ext>
+          </a:extLst>
+        </p:cNvPr>
         <p:cNvGrpSpPr/>
         <p:nvPr/>
       </p:nvGrpSpPr>
@@ -7911,39 +7997,117 @@
           <a:chExt cx="0" cy="0"/>
         </a:xfrm>
       </p:grpSpPr>
+      <p:sp>
+        <p:nvSpPr>
+          <p:cNvPr id="5" name="Slide Number Placeholder 4">
+            <a:extLst>
+              <a:ext uri="{FF2B5EF4-FFF2-40B4-BE49-F238E27FC236}">
+                <a16:creationId xmlns:a16="http://schemas.microsoft.com/office/drawing/2014/main" id="{7FB7E6E0-9B25-A48B-5C84-5267137B432B}"/>
+              </a:ext>
+            </a:extLst>
+          </p:cNvPr>
+          <p:cNvSpPr>
+            <a:spLocks noGrp="1"/>
+          </p:cNvSpPr>
+          <p:nvPr>
+            <p:ph type="sldNum" sz="quarter" idx="13"/>
+          </p:nvPr>
+        </p:nvSpPr>
+        <p:spPr>
+          <a:xfrm>
+            <a:off x="220870" y="6353919"/>
+            <a:ext cx="431800" cy="365125"/>
+          </a:xfrm>
+        </p:spPr>
+        <p:txBody>
+          <a:bodyPr/>
+          <a:lstStyle/>
+          <a:p>
+            <a:r>
+              <a:rPr lang="en-IN" dirty="0">
+                <a:solidFill>
+                  <a:prstClr val="black"/>
+                </a:solidFill>
+              </a:rPr>
+              <a:t>3</a:t>
+            </a:r>
+          </a:p>
+        </p:txBody>
+      </p:sp>
+      <p:sp>
+        <p:nvSpPr>
+          <p:cNvPr id="9" name="TextBox 8">
+            <a:extLst>
+              <a:ext uri="{FF2B5EF4-FFF2-40B4-BE49-F238E27FC236}">
+                <a16:creationId xmlns:a16="http://schemas.microsoft.com/office/drawing/2014/main" id="{B33B693F-7053-0E60-CD35-457F3587C04E}"/>
+              </a:ext>
+            </a:extLst>
+          </p:cNvPr>
+          <p:cNvSpPr txBox="1"/>
+          <p:nvPr/>
+        </p:nvSpPr>
+        <p:spPr>
+          <a:xfrm>
+            <a:off x="652670" y="192157"/>
+            <a:ext cx="1696298" cy="707886"/>
+          </a:xfrm>
+          <a:prstGeom prst="rect">
+            <a:avLst/>
+          </a:prstGeom>
+          <a:noFill/>
+        </p:spPr>
+        <p:txBody>
+          <a:bodyPr wrap="none" rtlCol="0">
+            <a:spAutoFit/>
+          </a:bodyPr>
+          <a:lstStyle/>
+          <a:p>
+            <a:r>
+              <a:rPr lang="en-IN" sz="4000" dirty="0">
+                <a:solidFill>
+                  <a:schemeClr val="accent2">
+                    <a:lumMod val="50000"/>
+                  </a:schemeClr>
+                </a:solidFill>
+                <a:latin typeface="Times New Roman" panose="02020603050405020304" pitchFamily="18" charset="0"/>
+                <a:cs typeface="Times New Roman" panose="02020603050405020304" pitchFamily="18" charset="0"/>
+              </a:rPr>
+              <a:t>Results</a:t>
+            </a:r>
+          </a:p>
+        </p:txBody>
+      </p:sp>
       <p:pic>
         <p:nvPicPr>
-          <p:cNvPr id="4" name="Content Placeholder 3">
+          <p:cNvPr id="3" name="Picture 2">
             <a:extLst>
               <a:ext uri="{FF2B5EF4-FFF2-40B4-BE49-F238E27FC236}">
-                <a16:creationId xmlns:a16="http://schemas.microsoft.com/office/drawing/2014/main" id="{78F457A9-10DF-4C15-E8B6-715FF2015E62}"/>
+                <a16:creationId xmlns:a16="http://schemas.microsoft.com/office/drawing/2014/main" id="{2678BB7E-14CB-D435-4959-F11FC34C426D}"/>
               </a:ext>
             </a:extLst>
           </p:cNvPr>
           <p:cNvPicPr>
-            <a:picLocks noGrp="1" noChangeAspect="1"/>
+            <a:picLocks noChangeAspect="1"/>
           </p:cNvPicPr>
-          <p:nvPr>
-            <p:ph idx="1"/>
-          </p:nvPr>
+          <p:nvPr/>
         </p:nvPicPr>
         <p:blipFill rotWithShape="1">
-          <a:blip r:embed="rId2">
+          <a:blip r:embed="rId3">
             <a:extLst>
               <a:ext uri="{28A0092B-C50C-407E-A947-70E740481C1C}">
                 <a14:useLocalDpi xmlns:a14="http://schemas.microsoft.com/office/drawing/2010/main" val="0"/>
               </a:ext>
             </a:extLst>
           </a:blip>
-          <a:srcRect l="997" t="10238" r="498"/>
+          <a:srcRect l="997" r="498"/>
           <a:stretch>
             <a:fillRect/>
           </a:stretch>
         </p:blipFill>
         <p:spPr bwMode="auto">
           <a:xfrm>
-            <a:off x="6501392" y="1361773"/>
-            <a:ext cx="5545091" cy="3738857"/>
+            <a:off x="220870" y="1865947"/>
+            <a:ext cx="5648898" cy="3644050"/>
           </a:xfrm>
           <a:prstGeom prst="rect">
             <a:avLst/>
@@ -7961,6 +8125,77 @@
           </a:extLst>
         </p:spPr>
       </p:pic>
+      <p:pic>
+        <p:nvPicPr>
+          <p:cNvPr id="4" name="Picture 3">
+            <a:extLst>
+              <a:ext uri="{FF2B5EF4-FFF2-40B4-BE49-F238E27FC236}">
+                <a16:creationId xmlns:a16="http://schemas.microsoft.com/office/drawing/2014/main" id="{F02927C4-C583-5C18-F6D1-EAD9CD920DE6}"/>
+              </a:ext>
+            </a:extLst>
+          </p:cNvPr>
+          <p:cNvPicPr>
+            <a:picLocks noChangeAspect="1"/>
+          </p:cNvPicPr>
+          <p:nvPr/>
+        </p:nvPicPr>
+        <p:blipFill>
+          <a:blip r:embed="rId4" cstate="print">
+            <a:extLst>
+              <a:ext uri="{28A0092B-C50C-407E-A947-70E740481C1C}">
+                <a14:useLocalDpi xmlns:a14="http://schemas.microsoft.com/office/drawing/2010/main" val="0"/>
+              </a:ext>
+            </a:extLst>
+          </a:blip>
+          <a:stretch>
+            <a:fillRect/>
+          </a:stretch>
+        </p:blipFill>
+        <p:spPr>
+          <a:xfrm>
+            <a:off x="5980052" y="1865947"/>
+            <a:ext cx="5943180" cy="3644050"/>
+          </a:xfrm>
+          <a:prstGeom prst="rect">
+            <a:avLst/>
+          </a:prstGeom>
+          <a:ln>
+            <a:solidFill>
+              <a:schemeClr val="tx1"/>
+            </a:solidFill>
+          </a:ln>
+        </p:spPr>
+      </p:pic>
+    </p:spTree>
+    <p:extLst>
+      <p:ext uri="{BB962C8B-B14F-4D97-AF65-F5344CB8AC3E}">
+        <p14:creationId xmlns:p14="http://schemas.microsoft.com/office/powerpoint/2010/main" val="135470163"/>
+      </p:ext>
+    </p:extLst>
+  </p:cSld>
+  <p:clrMapOvr>
+    <a:masterClrMapping/>
+  </p:clrMapOvr>
+</p:sld>
+</file>
+
+<file path=ppt/slides/slide4.xml><?xml version="1.0" encoding="utf-8"?>
+<p:sld xmlns:a="http://schemas.openxmlformats.org/drawingml/2006/main" xmlns:r="http://schemas.openxmlformats.org/officeDocument/2006/relationships" xmlns:p="http://schemas.openxmlformats.org/presentationml/2006/main">
+  <p:cSld>
+    <p:spTree>
+      <p:nvGrpSpPr>
+        <p:cNvPr id="1" name=""/>
+        <p:cNvGrpSpPr/>
+        <p:nvPr/>
+      </p:nvGrpSpPr>
+      <p:grpSpPr>
+        <a:xfrm>
+          <a:off x="0" y="0"/>
+          <a:ext cx="0" cy="0"/>
+          <a:chOff x="0" y="0"/>
+          <a:chExt cx="0" cy="0"/>
+        </a:xfrm>
+      </p:grpSpPr>
       <p:sp>
         <p:nvSpPr>
           <p:cNvPr id="5" name="TextBox 4">
@@ -8019,15 +8254,15 @@
           <p:nvPr/>
         </p:nvPicPr>
         <p:blipFill>
-          <a:blip r:embed="rId3"/>
+          <a:blip r:embed="rId2"/>
           <a:stretch>
             <a:fillRect/>
           </a:stretch>
         </p:blipFill>
         <p:spPr>
           <a:xfrm>
-            <a:off x="89658" y="1361773"/>
-            <a:ext cx="6300511" cy="1782583"/>
+            <a:off x="89659" y="1361773"/>
+            <a:ext cx="6006342" cy="1782583"/>
           </a:xfrm>
           <a:prstGeom prst="rect">
             <a:avLst/>
@@ -8049,15 +8284,15 @@
           <p:nvPr/>
         </p:nvPicPr>
         <p:blipFill>
-          <a:blip r:embed="rId4"/>
+          <a:blip r:embed="rId3"/>
           <a:stretch>
             <a:fillRect/>
           </a:stretch>
         </p:blipFill>
         <p:spPr>
           <a:xfrm>
-            <a:off x="89658" y="3318047"/>
-            <a:ext cx="6300511" cy="1782583"/>
+            <a:off x="89659" y="3318047"/>
+            <a:ext cx="6006342" cy="1782583"/>
           </a:xfrm>
           <a:prstGeom prst="rect">
             <a:avLst/>
@@ -8096,11 +8331,122 @@
                   <a:prstClr val="black"/>
                 </a:solidFill>
               </a:rPr>
-              <a:t>3</a:t>
+              <a:t>4</a:t>
             </a:r>
           </a:p>
         </p:txBody>
       </p:sp>
+      <p:sp>
+        <p:nvSpPr>
+          <p:cNvPr id="2" name="AutoShape 2">
+            <a:extLst>
+              <a:ext uri="{FF2B5EF4-FFF2-40B4-BE49-F238E27FC236}">
+                <a16:creationId xmlns:a16="http://schemas.microsoft.com/office/drawing/2014/main" id="{F595D3A1-EC80-129F-3B4A-EE88B21510B6}"/>
+              </a:ext>
+            </a:extLst>
+          </p:cNvPr>
+          <p:cNvSpPr>
+            <a:spLocks noChangeAspect="1" noChangeArrowheads="1"/>
+          </p:cNvSpPr>
+          <p:nvPr/>
+        </p:nvSpPr>
+        <p:spPr bwMode="auto">
+          <a:xfrm>
+            <a:off x="5943600" y="3276600"/>
+            <a:ext cx="304800" cy="304800"/>
+          </a:xfrm>
+          <a:prstGeom prst="rect">
+            <a:avLst/>
+          </a:prstGeom>
+          <a:noFill/>
+          <a:extLst>
+            <a:ext uri="{909E8E84-426E-40DD-AFC4-6F175D3DCCD1}">
+              <a14:hiddenFill xmlns:a14="http://schemas.microsoft.com/office/drawing/2010/main">
+                <a:solidFill>
+                  <a:srgbClr val="FFFFFF"/>
+                </a:solidFill>
+              </a14:hiddenFill>
+            </a:ext>
+          </a:extLst>
+        </p:spPr>
+        <p:txBody>
+          <a:bodyPr vert="horz" wrap="square" lIns="91440" tIns="45720" rIns="91440" bIns="45720" numCol="1" anchor="t" anchorCtr="0" compatLnSpc="1">
+            <a:prstTxWarp prst="textNoShape">
+              <a:avLst/>
+            </a:prstTxWarp>
+          </a:bodyPr>
+          <a:lstStyle/>
+          <a:p>
+            <a:endParaRPr lang="en-IN"/>
+          </a:p>
+        </p:txBody>
+      </p:sp>
+      <p:pic>
+        <p:nvPicPr>
+          <p:cNvPr id="8" name="Picture 7">
+            <a:extLst>
+              <a:ext uri="{FF2B5EF4-FFF2-40B4-BE49-F238E27FC236}">
+                <a16:creationId xmlns:a16="http://schemas.microsoft.com/office/drawing/2014/main" id="{A6EF9828-8C32-A4EB-1C93-253F328FC7E0}"/>
+              </a:ext>
+            </a:extLst>
+          </p:cNvPr>
+          <p:cNvPicPr>
+            <a:picLocks noChangeAspect="1"/>
+          </p:cNvPicPr>
+          <p:nvPr/>
+        </p:nvPicPr>
+        <p:blipFill>
+          <a:blip r:embed="rId4"/>
+          <a:stretch>
+            <a:fillRect/>
+          </a:stretch>
+        </p:blipFill>
+        <p:spPr>
+          <a:xfrm>
+            <a:off x="6200222" y="1361773"/>
+            <a:ext cx="5722374" cy="1782583"/>
+          </a:xfrm>
+          <a:prstGeom prst="rect">
+            <a:avLst/>
+          </a:prstGeom>
+        </p:spPr>
+      </p:pic>
+      <p:pic>
+        <p:nvPicPr>
+          <p:cNvPr id="14" name="Picture 13">
+            <a:extLst>
+              <a:ext uri="{FF2B5EF4-FFF2-40B4-BE49-F238E27FC236}">
+                <a16:creationId xmlns:a16="http://schemas.microsoft.com/office/drawing/2014/main" id="{19471CCF-094C-70D1-7401-3277C82B8133}"/>
+              </a:ext>
+            </a:extLst>
+          </p:cNvPr>
+          <p:cNvPicPr>
+            <a:picLocks noChangeAspect="1"/>
+          </p:cNvPicPr>
+          <p:nvPr/>
+        </p:nvPicPr>
+        <p:blipFill>
+          <a:blip r:embed="rId5">
+            <a:extLst>
+              <a:ext uri="{28A0092B-C50C-407E-A947-70E740481C1C}">
+                <a14:useLocalDpi xmlns:a14="http://schemas.microsoft.com/office/drawing/2010/main" val="0"/>
+              </a:ext>
+            </a:extLst>
+          </a:blip>
+          <a:stretch>
+            <a:fillRect/>
+          </a:stretch>
+        </p:blipFill>
+        <p:spPr>
+          <a:xfrm>
+            <a:off x="6200222" y="3318046"/>
+            <a:ext cx="5722374" cy="1782583"/>
+          </a:xfrm>
+          <a:prstGeom prst="rect">
+            <a:avLst/>
+          </a:prstGeom>
+        </p:spPr>
+      </p:pic>
     </p:spTree>
     <p:extLst>
       <p:ext uri="{BB962C8B-B14F-4D97-AF65-F5344CB8AC3E}">
@@ -8114,7 +8460,7 @@
 </p:sld>
 </file>
 
-<file path=ppt/slides/slide4.xml><?xml version="1.0" encoding="utf-8"?>
+<file path=ppt/slides/slide5.xml><?xml version="1.0" encoding="utf-8"?>
 <p:sld xmlns:a="http://schemas.openxmlformats.org/drawingml/2006/main" xmlns:r="http://schemas.openxmlformats.org/officeDocument/2006/relationships" xmlns:p="http://schemas.openxmlformats.org/presentationml/2006/main">
   <p:cSld>
     <p:spTree>
@@ -8169,7 +8515,7 @@
                   <a:prstClr val="black"/>
                 </a:solidFill>
               </a:rPr>
-              <a:t>4</a:t>
+              <a:t>5</a:t>
             </a:r>
           </a:p>
         </p:txBody>
@@ -8610,7 +8956,7 @@
 </p:sld>
 </file>
 
-<file path=ppt/slides/slide5.xml><?xml version="1.0" encoding="utf-8"?>
+<file path=ppt/slides/slide6.xml><?xml version="1.0" encoding="utf-8"?>
 <p:sld xmlns:a="http://schemas.openxmlformats.org/drawingml/2006/main" xmlns:r="http://schemas.openxmlformats.org/officeDocument/2006/relationships" xmlns:p="http://schemas.openxmlformats.org/presentationml/2006/main">
   <p:cSld>
     <p:spTree>
@@ -8665,7 +9011,7 @@
                   <a:prstClr val="black"/>
                 </a:solidFill>
               </a:rPr>
-              <a:t>5</a:t>
+              <a:t>6</a:t>
             </a:r>
           </a:p>
         </p:txBody>

</xml_diff>